<commit_message>
add 17th pcl api: IntensityGradientEstimation
</commit_message>
<xml_diff>
--- a/其他资料/线上会议/2021_10_17/20211017.pptx
+++ b/其他资料/线上会议/2021_10_17/20211017.pptx
@@ -248,7 +248,7 @@
           <a:p>
             <a:fld id="{D997B5FA-0921-464F-AAE1-844C04324D75}" type="datetimeFigureOut">
               <a:rPr lang="zh-CN" altLang="en-US" smtClean="0"/>
-              <a:t>2021/10/15</a:t>
+              <a:t>2021/10/17</a:t>
             </a:fld>
             <a:endParaRPr lang="zh-CN" altLang="en-US"/>
           </a:p>
@@ -416,7 +416,7 @@
           <a:p>
             <a:fld id="{D997B5FA-0921-464F-AAE1-844C04324D75}" type="datetimeFigureOut">
               <a:rPr lang="zh-CN" altLang="en-US" smtClean="0"/>
-              <a:t>2021/10/15</a:t>
+              <a:t>2021/10/17</a:t>
             </a:fld>
             <a:endParaRPr lang="zh-CN" altLang="en-US"/>
           </a:p>
@@ -594,7 +594,7 @@
           <a:p>
             <a:fld id="{D997B5FA-0921-464F-AAE1-844C04324D75}" type="datetimeFigureOut">
               <a:rPr lang="zh-CN" altLang="en-US" smtClean="0"/>
-              <a:t>2021/10/15</a:t>
+              <a:t>2021/10/17</a:t>
             </a:fld>
             <a:endParaRPr lang="zh-CN" altLang="en-US"/>
           </a:p>
@@ -762,7 +762,7 @@
           <a:p>
             <a:fld id="{D997B5FA-0921-464F-AAE1-844C04324D75}" type="datetimeFigureOut">
               <a:rPr lang="zh-CN" altLang="en-US" smtClean="0"/>
-              <a:t>2021/10/15</a:t>
+              <a:t>2021/10/17</a:t>
             </a:fld>
             <a:endParaRPr lang="zh-CN" altLang="en-US"/>
           </a:p>
@@ -1007,7 +1007,7 @@
           <a:p>
             <a:fld id="{D997B5FA-0921-464F-AAE1-844C04324D75}" type="datetimeFigureOut">
               <a:rPr lang="zh-CN" altLang="en-US" smtClean="0"/>
-              <a:t>2021/10/15</a:t>
+              <a:t>2021/10/17</a:t>
             </a:fld>
             <a:endParaRPr lang="zh-CN" altLang="en-US"/>
           </a:p>
@@ -1236,7 +1236,7 @@
           <a:p>
             <a:fld id="{D997B5FA-0921-464F-AAE1-844C04324D75}" type="datetimeFigureOut">
               <a:rPr lang="zh-CN" altLang="en-US" smtClean="0"/>
-              <a:t>2021/10/15</a:t>
+              <a:t>2021/10/17</a:t>
             </a:fld>
             <a:endParaRPr lang="zh-CN" altLang="en-US"/>
           </a:p>
@@ -1600,7 +1600,7 @@
           <a:p>
             <a:fld id="{D997B5FA-0921-464F-AAE1-844C04324D75}" type="datetimeFigureOut">
               <a:rPr lang="zh-CN" altLang="en-US" smtClean="0"/>
-              <a:t>2021/10/15</a:t>
+              <a:t>2021/10/17</a:t>
             </a:fld>
             <a:endParaRPr lang="zh-CN" altLang="en-US"/>
           </a:p>
@@ -1717,7 +1717,7 @@
           <a:p>
             <a:fld id="{D997B5FA-0921-464F-AAE1-844C04324D75}" type="datetimeFigureOut">
               <a:rPr lang="zh-CN" altLang="en-US" smtClean="0"/>
-              <a:t>2021/10/15</a:t>
+              <a:t>2021/10/17</a:t>
             </a:fld>
             <a:endParaRPr lang="zh-CN" altLang="en-US"/>
           </a:p>
@@ -1812,7 +1812,7 @@
           <a:p>
             <a:fld id="{D997B5FA-0921-464F-AAE1-844C04324D75}" type="datetimeFigureOut">
               <a:rPr lang="zh-CN" altLang="en-US" smtClean="0"/>
-              <a:t>2021/10/15</a:t>
+              <a:t>2021/10/17</a:t>
             </a:fld>
             <a:endParaRPr lang="zh-CN" altLang="en-US"/>
           </a:p>
@@ -2087,7 +2087,7 @@
           <a:p>
             <a:fld id="{D997B5FA-0921-464F-AAE1-844C04324D75}" type="datetimeFigureOut">
               <a:rPr lang="zh-CN" altLang="en-US" smtClean="0"/>
-              <a:t>2021/10/15</a:t>
+              <a:t>2021/10/17</a:t>
             </a:fld>
             <a:endParaRPr lang="zh-CN" altLang="en-US"/>
           </a:p>
@@ -2339,7 +2339,7 @@
           <a:p>
             <a:fld id="{D997B5FA-0921-464F-AAE1-844C04324D75}" type="datetimeFigureOut">
               <a:rPr lang="zh-CN" altLang="en-US" smtClean="0"/>
-              <a:t>2021/10/15</a:t>
+              <a:t>2021/10/17</a:t>
             </a:fld>
             <a:endParaRPr lang="zh-CN" altLang="en-US"/>
           </a:p>
@@ -2550,7 +2550,7 @@
           <a:p>
             <a:fld id="{D997B5FA-0921-464F-AAE1-844C04324D75}" type="datetimeFigureOut">
               <a:rPr lang="zh-CN" altLang="en-US" smtClean="0"/>
-              <a:t>2021/10/15</a:t>
+              <a:t>2021/10/17</a:t>
             </a:fld>
             <a:endParaRPr lang="zh-CN" altLang="en-US"/>
           </a:p>
@@ -3309,7 +3309,15 @@
                 <a:ea typeface="华文中宋" panose="02010600040101010101" pitchFamily="2" charset="-122"/>
                 <a:cs typeface="Times New Roman" panose="02020603050405020304" pitchFamily="18" charset="0"/>
               </a:rPr>
-              <a:t>信息的获取与处理，</a:t>
+              <a:t>信息的获取与处理</a:t>
+            </a:r>
+            <a:r>
+              <a:rPr lang="zh-CN" altLang="en-US" sz="2200" kern="100" dirty="0">
+                <a:effectLst/>
+                <a:ea typeface="华文中宋" panose="02010600040101010101" pitchFamily="2" charset="-122"/>
+                <a:cs typeface="Times New Roman" panose="02020603050405020304" pitchFamily="18" charset="0"/>
+              </a:rPr>
+              <a:t>。</a:t>
             </a:r>
             <a:endParaRPr lang="en-US" altLang="zh-CN" sz="2200" kern="100" dirty="0">
               <a:effectLst/>
@@ -4562,43 +4570,6 @@
               </a:rPr>
               <a:t>？</a:t>
             </a:r>
-            <a:endParaRPr lang="en-US" altLang="zh-CN" sz="2000" dirty="0">
-              <a:effectLst/>
-              <a:latin typeface="华文中宋" panose="02010600040101010101" pitchFamily="2" charset="-122"/>
-              <a:ea typeface="华文中宋" panose="02010600040101010101" pitchFamily="2" charset="-122"/>
-              <a:cs typeface="Times New Roman" panose="02020603050405020304" pitchFamily="18" charset="0"/>
-            </a:endParaRPr>
-          </a:p>
-          <a:p>
-            <a:pPr marL="0" indent="0">
-              <a:buNone/>
-            </a:pPr>
-            <a:r>
-              <a:rPr lang="en-US" altLang="zh-CN" sz="2000" dirty="0">
-                <a:latin typeface="华文中宋" panose="02010600040101010101" pitchFamily="2" charset="-122"/>
-                <a:ea typeface="华文中宋" panose="02010600040101010101" pitchFamily="2" charset="-122"/>
-                <a:cs typeface="Times New Roman" panose="02020603050405020304" pitchFamily="18" charset="0"/>
-              </a:rPr>
-              <a:t>     </a:t>
-            </a:r>
-            <a:r>
-              <a:rPr lang="zh-CN" altLang="en-US" sz="2000" dirty="0">
-                <a:solidFill>
-                  <a:srgbClr val="FF0000"/>
-                </a:solidFill>
-                <a:latin typeface="华文中宋" panose="02010600040101010101" pitchFamily="2" charset="-122"/>
-                <a:ea typeface="华文中宋" panose="02010600040101010101" pitchFamily="2" charset="-122"/>
-                <a:cs typeface="Times New Roman" panose="02020603050405020304" pitchFamily="18" charset="0"/>
-              </a:rPr>
-              <a:t>（初步的）</a:t>
-            </a:r>
-            <a:endParaRPr lang="zh-CN" altLang="en-US" sz="3200" dirty="0">
-              <a:solidFill>
-                <a:srgbClr val="FF0000"/>
-              </a:solidFill>
-              <a:latin typeface="华文中宋" panose="02010600040101010101" pitchFamily="2" charset="-122"/>
-              <a:ea typeface="华文中宋" panose="02010600040101010101" pitchFamily="2" charset="-122"/>
-            </a:endParaRPr>
           </a:p>
         </p:txBody>
       </p:sp>
@@ -5213,109 +5184,6 @@
                       </p:childTnLst>
                     </p:cTn>
                   </p:par>
-                  <p:par>
-                    <p:cTn id="21" fill="hold">
-                      <p:stCondLst>
-                        <p:cond delay="indefinite"/>
-                      </p:stCondLst>
-                      <p:childTnLst>
-                        <p:par>
-                          <p:cTn id="22" fill="hold">
-                            <p:stCondLst>
-                              <p:cond delay="0"/>
-                            </p:stCondLst>
-                            <p:childTnLst>
-                              <p:par>
-                                <p:cTn id="23" presetID="2" presetClass="entr" presetSubtype="4" fill="hold" grpId="0" nodeType="clickEffect">
-                                  <p:stCondLst>
-                                    <p:cond delay="0"/>
-                                  </p:stCondLst>
-                                  <p:childTnLst>
-                                    <p:set>
-                                      <p:cBhvr>
-                                        <p:cTn id="24" dur="1" fill="hold">
-                                          <p:stCondLst>
-                                            <p:cond delay="0"/>
-                                          </p:stCondLst>
-                                        </p:cTn>
-                                        <p:tgtEl>
-                                          <p:spTgt spid="3">
-                                            <p:txEl>
-                                              <p:pRg st="2" end="2"/>
-                                            </p:txEl>
-                                          </p:spTgt>
-                                        </p:tgtEl>
-                                        <p:attrNameLst>
-                                          <p:attrName>style.visibility</p:attrName>
-                                        </p:attrNameLst>
-                                      </p:cBhvr>
-                                      <p:to>
-                                        <p:strVal val="visible"/>
-                                      </p:to>
-                                    </p:set>
-                                    <p:anim calcmode="lin" valueType="num">
-                                      <p:cBhvr additive="base">
-                                        <p:cTn id="25" dur="500" fill="hold"/>
-                                        <p:tgtEl>
-                                          <p:spTgt spid="3">
-                                            <p:txEl>
-                                              <p:pRg st="2" end="2"/>
-                                            </p:txEl>
-                                          </p:spTgt>
-                                        </p:tgtEl>
-                                        <p:attrNameLst>
-                                          <p:attrName>ppt_x</p:attrName>
-                                        </p:attrNameLst>
-                                      </p:cBhvr>
-                                      <p:tavLst>
-                                        <p:tav tm="0">
-                                          <p:val>
-                                            <p:strVal val="#ppt_x"/>
-                                          </p:val>
-                                        </p:tav>
-                                        <p:tav tm="100000">
-                                          <p:val>
-                                            <p:strVal val="#ppt_x"/>
-                                          </p:val>
-                                        </p:tav>
-                                      </p:tavLst>
-                                    </p:anim>
-                                    <p:anim calcmode="lin" valueType="num">
-                                      <p:cBhvr additive="base">
-                                        <p:cTn id="26" dur="500" fill="hold"/>
-                                        <p:tgtEl>
-                                          <p:spTgt spid="3">
-                                            <p:txEl>
-                                              <p:pRg st="2" end="2"/>
-                                            </p:txEl>
-                                          </p:spTgt>
-                                        </p:tgtEl>
-                                        <p:attrNameLst>
-                                          <p:attrName>ppt_y</p:attrName>
-                                        </p:attrNameLst>
-                                      </p:cBhvr>
-                                      <p:tavLst>
-                                        <p:tav tm="0">
-                                          <p:val>
-                                            <p:strVal val="1+#ppt_h/2"/>
-                                          </p:val>
-                                        </p:tav>
-                                        <p:tav tm="100000">
-                                          <p:val>
-                                            <p:strVal val="#ppt_y"/>
-                                          </p:val>
-                                        </p:tav>
-                                      </p:tavLst>
-                                    </p:anim>
-                                  </p:childTnLst>
-                                </p:cTn>
-                              </p:par>
-                            </p:childTnLst>
-                          </p:cTn>
-                        </p:par>
-                      </p:childTnLst>
-                    </p:cTn>
-                  </p:par>
                 </p:childTnLst>
               </p:cTn>
               <p:prevCondLst>
@@ -5432,7 +5300,7 @@
                 <a:latin typeface="华文中宋" panose="02010600040101010101" pitchFamily="2" charset="-122"/>
                 <a:ea typeface="华文中宋" panose="02010600040101010101" pitchFamily="2" charset="-122"/>
               </a:rPr>
-              <a:t>介绍文件夹内容</a:t>
+              <a:t>介绍资料文件夹的内容</a:t>
             </a:r>
             <a:endParaRPr lang="en-US" altLang="zh-CN" sz="2000" dirty="0">
               <a:latin typeface="华文中宋" panose="02010600040101010101" pitchFamily="2" charset="-122"/>
@@ -5446,6 +5314,155 @@
                 <a:ea typeface="华文中宋" panose="02010600040101010101" pitchFamily="2" charset="-122"/>
               </a:rPr>
               <a:t>样例演示</a:t>
+            </a:r>
+          </a:p>
+        </p:txBody>
+      </p:sp>
+      <p:sp>
+        <p:nvSpPr>
+          <p:cNvPr id="5" name="文本框 4">
+            <a:extLst>
+              <a:ext uri="{FF2B5EF4-FFF2-40B4-BE49-F238E27FC236}">
+                <a16:creationId xmlns:a16="http://schemas.microsoft.com/office/drawing/2014/main" id="{980AB61A-D5E1-4844-BE9D-9A6128757697}"/>
+              </a:ext>
+            </a:extLst>
+          </p:cNvPr>
+          <p:cNvSpPr txBox="1"/>
+          <p:nvPr/>
+        </p:nvSpPr>
+        <p:spPr>
+          <a:xfrm>
+            <a:off x="838200" y="3493858"/>
+            <a:ext cx="6096866" cy="2346155"/>
+          </a:xfrm>
+          <a:prstGeom prst="rect">
+            <a:avLst/>
+          </a:prstGeom>
+          <a:noFill/>
+        </p:spPr>
+        <p:txBody>
+          <a:bodyPr wrap="square">
+            <a:spAutoFit/>
+          </a:bodyPr>
+          <a:lstStyle/>
+          <a:p>
+            <a:pPr marL="457200" indent="-457200">
+              <a:lnSpc>
+                <a:spcPct val="150000"/>
+              </a:lnSpc>
+              <a:buFont typeface="+mj-lt"/>
+              <a:buAutoNum type="arabicPeriod"/>
+            </a:pPr>
+            <a:r>
+              <a:rPr lang="zh-CN" altLang="en-US" sz="2000" dirty="0">
+                <a:latin typeface="华文中宋" panose="02010600040101010101" pitchFamily="2" charset="-122"/>
+                <a:ea typeface="华文中宋" panose="02010600040101010101" pitchFamily="2" charset="-122"/>
+              </a:rPr>
+              <a:t>关注实现计算的接口</a:t>
+            </a:r>
+            <a:endParaRPr lang="en-US" altLang="zh-CN" sz="2000" dirty="0">
+              <a:latin typeface="华文中宋" panose="02010600040101010101" pitchFamily="2" charset="-122"/>
+              <a:ea typeface="华文中宋" panose="02010600040101010101" pitchFamily="2" charset="-122"/>
+            </a:endParaRPr>
+          </a:p>
+          <a:p>
+            <a:pPr marL="457200" indent="-457200">
+              <a:lnSpc>
+                <a:spcPct val="150000"/>
+              </a:lnSpc>
+              <a:buFont typeface="+mj-lt"/>
+              <a:buAutoNum type="arabicPeriod"/>
+            </a:pPr>
+            <a:r>
+              <a:rPr lang="zh-CN" altLang="en-US" sz="2000" dirty="0">
+                <a:latin typeface="华文中宋" panose="02010600040101010101" pitchFamily="2" charset="-122"/>
+                <a:ea typeface="华文中宋" panose="02010600040101010101" pitchFamily="2" charset="-122"/>
+              </a:rPr>
+              <a:t>关注接口中涉及计算的操作</a:t>
+            </a:r>
+          </a:p>
+          <a:p>
+            <a:pPr marL="457200" indent="-457200">
+              <a:lnSpc>
+                <a:spcPct val="150000"/>
+              </a:lnSpc>
+              <a:buFont typeface="+mj-lt"/>
+              <a:buAutoNum type="arabicPeriod"/>
+            </a:pPr>
+            <a:r>
+              <a:rPr lang="zh-CN" altLang="en-US" sz="2000" dirty="0">
+                <a:latin typeface="华文中宋" panose="02010600040101010101" pitchFamily="2" charset="-122"/>
+                <a:ea typeface="华文中宋" panose="02010600040101010101" pitchFamily="2" charset="-122"/>
+              </a:rPr>
+              <a:t>忽略for、i</a:t>
+            </a:r>
+            <a:r>
+              <a:rPr lang="en-US" altLang="zh-CN" sz="2000" dirty="0">
+                <a:latin typeface="华文中宋" panose="02010600040101010101" pitchFamily="2" charset="-122"/>
+                <a:ea typeface="华文中宋" panose="02010600040101010101" pitchFamily="2" charset="-122"/>
+              </a:rPr>
+              <a:t>f</a:t>
+            </a:r>
+            <a:r>
+              <a:rPr lang="zh-CN" altLang="en-US" sz="2000" dirty="0">
+                <a:latin typeface="华文中宋" panose="02010600040101010101" pitchFamily="2" charset="-122"/>
+                <a:ea typeface="华文中宋" panose="02010600040101010101" pitchFamily="2" charset="-122"/>
+              </a:rPr>
+              <a:t>等控制语句</a:t>
+            </a:r>
+          </a:p>
+          <a:p>
+            <a:pPr marL="457200" indent="-457200">
+              <a:lnSpc>
+                <a:spcPct val="150000"/>
+              </a:lnSpc>
+              <a:buFont typeface="+mj-lt"/>
+              <a:buAutoNum type="arabicPeriod"/>
+            </a:pPr>
+            <a:r>
+              <a:rPr lang="zh-CN" altLang="en-US" sz="2000" dirty="0">
+                <a:latin typeface="华文中宋" panose="02010600040101010101" pitchFamily="2" charset="-122"/>
+                <a:ea typeface="华文中宋" panose="02010600040101010101" pitchFamily="2" charset="-122"/>
+              </a:rPr>
+              <a:t>若当前分析的接口中调用了其他接口，在分析文档中给出提示但不对被调用的接口进行分析</a:t>
+            </a:r>
+          </a:p>
+        </p:txBody>
+      </p:sp>
+      <p:sp>
+        <p:nvSpPr>
+          <p:cNvPr id="6" name="文本框 5">
+            <a:extLst>
+              <a:ext uri="{FF2B5EF4-FFF2-40B4-BE49-F238E27FC236}">
+                <a16:creationId xmlns:a16="http://schemas.microsoft.com/office/drawing/2014/main" id="{39FA9BEE-ABF0-4179-A289-4A52279CDED0}"/>
+              </a:ext>
+            </a:extLst>
+          </p:cNvPr>
+          <p:cNvSpPr txBox="1"/>
+          <p:nvPr/>
+        </p:nvSpPr>
+        <p:spPr>
+          <a:xfrm>
+            <a:off x="838200" y="2930971"/>
+            <a:ext cx="3570208" cy="461665"/>
+          </a:xfrm>
+          <a:prstGeom prst="rect">
+            <a:avLst/>
+          </a:prstGeom>
+          <a:noFill/>
+        </p:spPr>
+        <p:txBody>
+          <a:bodyPr wrap="none" rtlCol="0">
+            <a:spAutoFit/>
+          </a:bodyPr>
+          <a:lstStyle/>
+          <a:p>
+            <a:r>
+              <a:rPr lang="zh-CN" altLang="en-US" sz="2400" dirty="0">
+                <a:latin typeface="华文中宋" panose="02010600040101010101" pitchFamily="2" charset="-122"/>
+                <a:ea typeface="华文中宋" panose="02010600040101010101" pitchFamily="2" charset="-122"/>
+              </a:rPr>
+              <a:t>分析过程中的注意事项：</a:t>
             </a:r>
           </a:p>
         </p:txBody>

</xml_diff>